<commit_message>
Commit 9 PPT Seminar Hasil Perbaiki
PPT Seminar Hasil Perbaiki yang Kurang penomoran dan penambahan Keterangan
</commit_message>
<xml_diff>
--- a/Presentasi Hasil Tesis Hary Rachmat 2108207010009.pptx
+++ b/Presentasi Hasil Tesis Hary Rachmat 2108207010009.pptx
@@ -49,7 +49,7 @@
     <p:sldId id="275" r:id="rId40"/>
   </p:sldIdLst>
   <p:sldSz cx="9144000" cy="5143500" type="screen16x9"/>
-  <p:notesSz cx="6858000" cy="9144000"/>
+  <p:notesSz cx="10020300" cy="6888163"/>
   <p:embeddedFontLst>
     <p:embeddedFont>
       <p:font typeface="Cambria Math" panose="02040503050406030204" pitchFamily="18" charset="0"/>
@@ -382,8 +382,8 @@
         </p:nvSpPr>
         <p:spPr>
           <a:xfrm>
-            <a:off x="381300" y="685800"/>
-            <a:ext cx="6096075" cy="3429000"/>
+            <a:off x="2714625" y="517525"/>
+            <a:ext cx="4591050" cy="2582863"/>
           </a:xfrm>
           <a:custGeom>
             <a:avLst/>
@@ -433,8 +433,8 @@
         </p:nvSpPr>
         <p:spPr>
           <a:xfrm>
-            <a:off x="685800" y="4343400"/>
-            <a:ext cx="5486400" cy="4114800"/>
+            <a:off x="1002030" y="3271878"/>
+            <a:ext cx="8016240" cy="3099673"/>
           </a:xfrm>
           <a:prstGeom prst="rect">
             <a:avLst/>
@@ -445,7 +445,7 @@
           </a:ln>
         </p:spPr>
         <p:txBody>
-          <a:bodyPr spcFirstLastPara="1" wrap="square" lIns="91425" tIns="91425" rIns="91425" bIns="91425" anchor="t" anchorCtr="0">
+          <a:bodyPr spcFirstLastPara="1" wrap="square" lIns="96645" tIns="96645" rIns="96645" bIns="96645" anchor="t" anchorCtr="0">
             <a:noAutofit/>
           </a:bodyPr>
           <a:lstStyle>
@@ -818,8 +818,8 @@
         </p:nvSpPr>
         <p:spPr>
           <a:xfrm>
-            <a:off x="381000" y="685800"/>
-            <a:ext cx="6096000" cy="3429000"/>
+            <a:off x="2714625" y="517525"/>
+            <a:ext cx="4591050" cy="2582863"/>
           </a:xfrm>
           <a:custGeom>
             <a:avLst/>
@@ -859,26 +859,20 @@
         </p:nvSpPr>
         <p:spPr>
           <a:xfrm>
-            <a:off x="685800" y="4343400"/>
-            <a:ext cx="5486400" cy="4114800"/>
+            <a:off x="1002030" y="3271878"/>
+            <a:ext cx="8016240" cy="3099673"/>
           </a:xfrm>
           <a:prstGeom prst="rect">
             <a:avLst/>
           </a:prstGeom>
         </p:spPr>
         <p:txBody>
-          <a:bodyPr spcFirstLastPara="1" wrap="square" lIns="91425" tIns="91425" rIns="91425" bIns="91425" anchor="t" anchorCtr="0">
+          <a:bodyPr spcFirstLastPara="1" wrap="square" lIns="96645" tIns="96645" rIns="96645" bIns="96645" anchor="t" anchorCtr="0">
             <a:noAutofit/>
           </a:bodyPr>
           <a:lstStyle/>
           <a:p>
-            <a:pPr marL="0" lvl="0" indent="0" algn="l" rtl="0">
-              <a:spcBef>
-                <a:spcPts val="0"/>
-              </a:spcBef>
-              <a:spcAft>
-                <a:spcPts val="0"/>
-              </a:spcAft>
+            <a:pPr marL="0" indent="0">
               <a:buNone/>
             </a:pPr>
             <a:endParaRPr/>
@@ -934,8 +928,8 @@
         </p:nvSpPr>
         <p:spPr>
           <a:xfrm>
-            <a:off x="381000" y="685800"/>
-            <a:ext cx="6096000" cy="3429000"/>
+            <a:off x="2714625" y="517525"/>
+            <a:ext cx="4591050" cy="2582863"/>
           </a:xfrm>
           <a:custGeom>
             <a:avLst/>
@@ -981,26 +975,20 @@
         </p:nvSpPr>
         <p:spPr>
           <a:xfrm>
-            <a:off x="685800" y="4343400"/>
-            <a:ext cx="5486400" cy="4114800"/>
+            <a:off x="1002030" y="3271878"/>
+            <a:ext cx="8016240" cy="3099673"/>
           </a:xfrm>
           <a:prstGeom prst="rect">
             <a:avLst/>
           </a:prstGeom>
         </p:spPr>
         <p:txBody>
-          <a:bodyPr spcFirstLastPara="1" wrap="square" lIns="91425" tIns="91425" rIns="91425" bIns="91425" anchor="t" anchorCtr="0">
+          <a:bodyPr spcFirstLastPara="1" wrap="square" lIns="96645" tIns="96645" rIns="96645" bIns="96645" anchor="t" anchorCtr="0">
             <a:noAutofit/>
           </a:bodyPr>
           <a:lstStyle/>
           <a:p>
-            <a:pPr marL="0" lvl="0" indent="0" algn="l" rtl="0">
-              <a:spcBef>
-                <a:spcPts val="0"/>
-              </a:spcBef>
-              <a:spcAft>
-                <a:spcPts val="0"/>
-              </a:spcAft>
+            <a:pPr marL="0" indent="0">
               <a:buNone/>
             </a:pPr>
             <a:endParaRPr/>
@@ -1049,8 +1037,8 @@
         </p:nvSpPr>
         <p:spPr>
           <a:xfrm>
-            <a:off x="381000" y="685800"/>
-            <a:ext cx="6096000" cy="3429000"/>
+            <a:off x="2714625" y="517525"/>
+            <a:ext cx="4591050" cy="2582863"/>
           </a:xfrm>
         </p:spPr>
       </p:sp>
@@ -1069,23 +1057,7 @@
           <a:bodyPr/>
           <a:lstStyle/>
           <a:p>
-            <a:pPr marL="457200" marR="0" lvl="0" indent="-298450" algn="l" defTabSz="914400" rtl="0" eaLnBrk="1" fontAlgn="auto" latinLnBrk="0" hangingPunct="1">
-              <a:lnSpc>
-                <a:spcPct val="100000"/>
-              </a:lnSpc>
-              <a:spcBef>
-                <a:spcPts val="0"/>
-              </a:spcBef>
-              <a:spcAft>
-                <a:spcPts val="0"/>
-              </a:spcAft>
-              <a:buClr>
-                <a:srgbClr val="000000"/>
-              </a:buClr>
-              <a:buSzPts val="1100"/>
-              <a:buFont typeface="Arial"/>
-              <a:buChar char="●"/>
-              <a:tabLst/>
+            <a:pPr marL="483306" indent="-315491" defTabSz="966612">
               <a:defRPr/>
             </a:pPr>
             <a:r>
@@ -1204,8 +1176,8 @@
         </p:nvSpPr>
         <p:spPr>
           <a:xfrm>
-            <a:off x="381000" y="685800"/>
-            <a:ext cx="6096000" cy="3429000"/>
+            <a:off x="2714625" y="517525"/>
+            <a:ext cx="4591050" cy="2582863"/>
           </a:xfrm>
         </p:spPr>
       </p:sp>
@@ -1230,23 +1202,7 @@
           <a:bodyPr/>
           <a:lstStyle/>
           <a:p>
-            <a:pPr marL="457200" marR="0" lvl="0" indent="-298450" algn="l" defTabSz="914400" rtl="0" eaLnBrk="1" fontAlgn="auto" latinLnBrk="0" hangingPunct="1">
-              <a:lnSpc>
-                <a:spcPct val="100000"/>
-              </a:lnSpc>
-              <a:spcBef>
-                <a:spcPts val="0"/>
-              </a:spcBef>
-              <a:spcAft>
-                <a:spcPts val="0"/>
-              </a:spcAft>
-              <a:buClr>
-                <a:srgbClr val="000000"/>
-              </a:buClr>
-              <a:buSzPts val="1100"/>
-              <a:buFont typeface="Arial"/>
-              <a:buChar char="●"/>
-              <a:tabLst/>
+            <a:pPr marL="483306" indent="-315491" defTabSz="966612">
               <a:defRPr/>
             </a:pPr>
             <a:endParaRPr lang="en-ID"/>
@@ -1307,8 +1263,8 @@
         </p:nvSpPr>
         <p:spPr>
           <a:xfrm>
-            <a:off x="381000" y="685800"/>
-            <a:ext cx="6096000" cy="3429000"/>
+            <a:off x="2714625" y="517525"/>
+            <a:ext cx="4591050" cy="2582863"/>
           </a:xfrm>
         </p:spPr>
       </p:sp>
@@ -1333,28 +1289,11 @@
           <a:bodyPr/>
           <a:lstStyle/>
           <a:p>
-            <a:pPr marL="457200" marR="0" lvl="0" indent="-298450" algn="l" defTabSz="914400" rtl="0" eaLnBrk="1" fontAlgn="auto" latinLnBrk="0" hangingPunct="1">
-              <a:lnSpc>
-                <a:spcPct val="100000"/>
-              </a:lnSpc>
-              <a:spcBef>
-                <a:spcPts val="0"/>
-              </a:spcBef>
-              <a:spcAft>
-                <a:spcPts val="0"/>
-              </a:spcAft>
-              <a:buClr>
-                <a:srgbClr val="000000"/>
-              </a:buClr>
-              <a:buSzPts val="1100"/>
-              <a:buFont typeface="Arial"/>
-              <a:buChar char="●"/>
-              <a:tabLst/>
+            <a:pPr marL="483306" indent="-315491" defTabSz="966612">
               <a:defRPr/>
             </a:pPr>
             <a:r>
-              <a:rPr lang="en-US" sz="1800">
-                <a:effectLst/>
+              <a:rPr lang="en-US" sz="1900">
                 <a:latin typeface="Times New Roman" panose="02020603050405020304" pitchFamily="18" charset="0"/>
                 <a:ea typeface="Times New Roman" panose="02020603050405020304" pitchFamily="18" charset="0"/>
               </a:rPr>
@@ -1362,23 +1301,7 @@
             </a:r>
           </a:p>
           <a:p>
-            <a:pPr marL="457200" marR="0" lvl="0" indent="-298450" algn="l" defTabSz="914400" rtl="0" eaLnBrk="1" fontAlgn="auto" latinLnBrk="0" hangingPunct="1">
-              <a:lnSpc>
-                <a:spcPct val="100000"/>
-              </a:lnSpc>
-              <a:spcBef>
-                <a:spcPts val="0"/>
-              </a:spcBef>
-              <a:spcAft>
-                <a:spcPts val="0"/>
-              </a:spcAft>
-              <a:buClr>
-                <a:srgbClr val="000000"/>
-              </a:buClr>
-              <a:buSzPts val="1100"/>
-              <a:buFont typeface="Arial"/>
-              <a:buChar char="●"/>
-              <a:tabLst/>
+            <a:pPr marL="483306" indent="-315491" defTabSz="966612">
               <a:defRPr/>
             </a:pPr>
             <a:r>
@@ -1469,8 +1392,8 @@
         </p:nvSpPr>
         <p:spPr>
           <a:xfrm>
-            <a:off x="381000" y="685800"/>
-            <a:ext cx="6096000" cy="3429000"/>
+            <a:off x="2714625" y="517525"/>
+            <a:ext cx="4591050" cy="2582863"/>
           </a:xfrm>
         </p:spPr>
       </p:sp>
@@ -1495,44 +1418,25 @@
           <a:bodyPr/>
           <a:lstStyle/>
           <a:p>
-            <a:pPr marL="457200" marR="0" lvl="0" indent="-298450" algn="l" defTabSz="914400" rtl="0" eaLnBrk="1" fontAlgn="auto" latinLnBrk="0" hangingPunct="1">
-              <a:lnSpc>
-                <a:spcPct val="100000"/>
-              </a:lnSpc>
-              <a:spcBef>
-                <a:spcPts val="0"/>
-              </a:spcBef>
-              <a:spcAft>
-                <a:spcPts val="0"/>
-              </a:spcAft>
-              <a:buClr>
-                <a:srgbClr val="000000"/>
-              </a:buClr>
-              <a:buSzPts val="1100"/>
-              <a:buFont typeface="Arial"/>
-              <a:buChar char="●"/>
-              <a:tabLst/>
+            <a:pPr marL="483306" indent="-315491" defTabSz="966612">
               <a:defRPr/>
             </a:pPr>
             <a:r>
-              <a:rPr lang="en-US" sz="1800">
-                <a:effectLst/>
+              <a:rPr lang="en-US" sz="1900">
                 <a:latin typeface="Times New Roman" panose="02020603050405020304" pitchFamily="18" charset="0"/>
                 <a:ea typeface="Times New Roman" panose="02020603050405020304" pitchFamily="18" charset="0"/>
               </a:rPr>
               <a:t>RAG tidak memiliki jalur pelatihan hanya memerlukan pipeline pengindeksan dan pipeline penyajian. Pipa pengindeksan digunakan untuk mengubah data menjadi representasi vektor dan mengindeksnya dalam database Vektor seperti yang dapat dilihat pada </a:t>
             </a:r>
             <a:r>
-              <a:rPr lang="en-GB" sz="1800">
-                <a:effectLst/>
+              <a:rPr lang="en-GB" sz="1900">
                 <a:latin typeface="Times New Roman" panose="02020603050405020304" pitchFamily="18" charset="0"/>
                 <a:ea typeface="Times New Roman" panose="02020603050405020304" pitchFamily="18" charset="0"/>
               </a:rPr>
-              <a:t>Gambar 3</a:t>
+              <a:t>Gambar 4.3</a:t>
             </a:r>
             <a:r>
-              <a:rPr lang="en-US" sz="1800">
-                <a:effectLst/>
+              <a:rPr lang="en-US" sz="1900">
                 <a:latin typeface="Times New Roman" panose="02020603050405020304" pitchFamily="18" charset="0"/>
                 <a:ea typeface="Times New Roman" panose="02020603050405020304" pitchFamily="18" charset="0"/>
               </a:rPr>
@@ -1596,8 +1500,8 @@
         </p:nvSpPr>
         <p:spPr>
           <a:xfrm>
-            <a:off x="381000" y="685800"/>
-            <a:ext cx="6096000" cy="3429000"/>
+            <a:off x="2714625" y="517525"/>
+            <a:ext cx="4591050" cy="2582863"/>
           </a:xfrm>
         </p:spPr>
       </p:sp>
@@ -1622,28 +1526,11 @@
           <a:bodyPr/>
           <a:lstStyle/>
           <a:p>
-            <a:pPr marL="457200" marR="0" lvl="0" indent="-298450" algn="l" defTabSz="914400" rtl="0" eaLnBrk="1" fontAlgn="auto" latinLnBrk="0" hangingPunct="1">
-              <a:lnSpc>
-                <a:spcPct val="100000"/>
-              </a:lnSpc>
-              <a:spcBef>
-                <a:spcPts val="0"/>
-              </a:spcBef>
-              <a:spcAft>
-                <a:spcPts val="0"/>
-              </a:spcAft>
-              <a:buClr>
-                <a:srgbClr val="000000"/>
-              </a:buClr>
-              <a:buSzPts val="1100"/>
-              <a:buFont typeface="Arial"/>
-              <a:buChar char="●"/>
-              <a:tabLst/>
+            <a:pPr marL="483306" indent="-315491" defTabSz="966612">
               <a:defRPr/>
             </a:pPr>
             <a:r>
-              <a:rPr lang="en-US" sz="1800">
-                <a:effectLst/>
+              <a:rPr lang="en-US" sz="1900">
                 <a:latin typeface="Times New Roman" panose="02020603050405020304" pitchFamily="18" charset="0"/>
                 <a:ea typeface="Times New Roman" panose="02020603050405020304" pitchFamily="18" charset="0"/>
               </a:rPr>
@@ -1707,8 +1594,8 @@
         </p:nvSpPr>
         <p:spPr>
           <a:xfrm>
-            <a:off x="381000" y="685800"/>
-            <a:ext cx="6096000" cy="3429000"/>
+            <a:off x="2714625" y="517525"/>
+            <a:ext cx="4591050" cy="2582863"/>
           </a:xfrm>
         </p:spPr>
       </p:sp>
@@ -1733,28 +1620,11 @@
           <a:bodyPr/>
           <a:lstStyle/>
           <a:p>
-            <a:pPr marL="457200" marR="0" lvl="0" indent="-298450" algn="l" defTabSz="914400" rtl="0" eaLnBrk="1" fontAlgn="auto" latinLnBrk="0" hangingPunct="1">
-              <a:lnSpc>
-                <a:spcPct val="100000"/>
-              </a:lnSpc>
-              <a:spcBef>
-                <a:spcPts val="0"/>
-              </a:spcBef>
-              <a:spcAft>
-                <a:spcPts val="0"/>
-              </a:spcAft>
-              <a:buClr>
-                <a:srgbClr val="000000"/>
-              </a:buClr>
-              <a:buSzPts val="1100"/>
-              <a:buFont typeface="Arial"/>
-              <a:buChar char="●"/>
-              <a:tabLst/>
+            <a:pPr marL="483306" indent="-315491" defTabSz="966612">
               <a:defRPr/>
             </a:pPr>
             <a:r>
-              <a:rPr lang="en-US" sz="1800">
-                <a:effectLst/>
+              <a:rPr lang="en-US" sz="1900">
                 <a:latin typeface="Times New Roman" panose="02020603050405020304" pitchFamily="18" charset="0"/>
                 <a:ea typeface="Times New Roman" panose="02020603050405020304" pitchFamily="18" charset="0"/>
               </a:rPr>
@@ -1818,8 +1688,8 @@
         </p:nvSpPr>
         <p:spPr>
           <a:xfrm>
-            <a:off x="381000" y="685800"/>
-            <a:ext cx="6096000" cy="3429000"/>
+            <a:off x="2714625" y="517525"/>
+            <a:ext cx="4591050" cy="2582863"/>
           </a:xfrm>
         </p:spPr>
       </p:sp>
@@ -1844,32 +1714,15 @@
           <a:bodyPr/>
           <a:lstStyle/>
           <a:p>
-            <a:pPr marL="457200" marR="0" lvl="0" indent="-298450" algn="l" defTabSz="914400" rtl="0" eaLnBrk="1" fontAlgn="auto" latinLnBrk="0" hangingPunct="1">
-              <a:lnSpc>
-                <a:spcPct val="100000"/>
-              </a:lnSpc>
-              <a:spcBef>
-                <a:spcPts val="0"/>
-              </a:spcBef>
-              <a:spcAft>
-                <a:spcPts val="0"/>
-              </a:spcAft>
-              <a:buClr>
-                <a:srgbClr val="000000"/>
-              </a:buClr>
-              <a:buSzPts val="1100"/>
-              <a:buFont typeface="Arial"/>
-              <a:buChar char="●"/>
-              <a:tabLst/>
+            <a:pPr marL="483306" indent="-315491" defTabSz="966612">
               <a:defRPr/>
             </a:pPr>
             <a:r>
-              <a:rPr lang="en-US" sz="1800">
-                <a:effectLst/>
+              <a:rPr lang="en-US" sz="1900">
                 <a:latin typeface="Times New Roman" panose="02020603050405020304" pitchFamily="18" charset="0"/>
                 <a:ea typeface="Times New Roman" panose="02020603050405020304" pitchFamily="18" charset="0"/>
               </a:rPr>
-              <a:t>Tidak seperti rouge-1, dan rouge-2, Rouge-L tidak melihat ke dalam unigram atau bigram, melainkan kesesuaian dengan LCS (Longest Common Subsequence) atau urutan kata terpanjang dalam referensi dan teks yang dihasilkan manusia.</a:t>
+              <a:t>Tidak seperti rouge-1, dan rouge-2, Rouge-L tidak melihat ke dalam unigram atau bigram, melainkan kesesuaian dengan LCS (Longest Common Subsequence) atau urutan kata terpanjang dalam referensi dan teks yang dihasilkan.</a:t>
             </a:r>
             <a:endParaRPr lang="en-ID"/>
           </a:p>
@@ -1929,8 +1782,8 @@
         </p:nvSpPr>
         <p:spPr>
           <a:xfrm>
-            <a:off x="381000" y="685800"/>
-            <a:ext cx="6096000" cy="3429000"/>
+            <a:off x="2714625" y="517525"/>
+            <a:ext cx="4591050" cy="2582863"/>
           </a:xfrm>
           <a:custGeom>
             <a:avLst/>
@@ -1976,26 +1829,20 @@
         </p:nvSpPr>
         <p:spPr>
           <a:xfrm>
-            <a:off x="685800" y="4343400"/>
-            <a:ext cx="5486400" cy="4114800"/>
+            <a:off x="1002030" y="3271878"/>
+            <a:ext cx="8016240" cy="3099673"/>
           </a:xfrm>
           <a:prstGeom prst="rect">
             <a:avLst/>
           </a:prstGeom>
         </p:spPr>
         <p:txBody>
-          <a:bodyPr spcFirstLastPara="1" wrap="square" lIns="91425" tIns="91425" rIns="91425" bIns="91425" anchor="t" anchorCtr="0">
+          <a:bodyPr spcFirstLastPara="1" wrap="square" lIns="96645" tIns="96645" rIns="96645" bIns="96645" anchor="t" anchorCtr="0">
             <a:noAutofit/>
           </a:bodyPr>
           <a:lstStyle/>
           <a:p>
-            <a:pPr marL="0" lvl="0" indent="0" algn="l" rtl="0">
-              <a:spcBef>
-                <a:spcPts val="0"/>
-              </a:spcBef>
-              <a:spcAft>
-                <a:spcPts val="0"/>
-              </a:spcAft>
+            <a:pPr marL="0" indent="0">
               <a:buNone/>
             </a:pPr>
             <a:endParaRPr/>
@@ -2044,8 +1891,8 @@
         </p:nvSpPr>
         <p:spPr>
           <a:xfrm>
-            <a:off x="381000" y="685800"/>
-            <a:ext cx="6096000" cy="3429000"/>
+            <a:off x="2714625" y="517525"/>
+            <a:ext cx="4591050" cy="2582863"/>
           </a:xfrm>
         </p:spPr>
       </p:sp>
@@ -2064,20 +1911,19 @@
           <a:bodyPr/>
           <a:lstStyle/>
           <a:p>
-            <a:pPr rtl="0">
-              <a:spcBef>
-                <a:spcPts val="1800"/>
-              </a:spcBef>
-              <a:spcAft>
-                <a:spcPts val="1800"/>
+            <a:pPr>
+              <a:spcBef>
+                <a:spcPts val="1903"/>
+              </a:spcBef>
+              <a:spcAft>
+                <a:spcPts val="1903"/>
               </a:spcAft>
             </a:pPr>
             <a:r>
-              <a:rPr lang="en-ID" sz="1800" b="0" i="0" u="none" strike="noStrike">
+              <a:rPr lang="en-ID" sz="1900">
                 <a:solidFill>
                   <a:srgbClr val="0A0A0A"/>
                 </a:solidFill>
-                <a:effectLst/>
                 <a:latin typeface="Arial" panose="020B0604020202020204" pitchFamily="34" charset="0"/>
               </a:rPr>
               <a:t>Skor ROUGE yang baik bervariasi berdasarkan tugas ringkasan dan metrik. Skor ROUGE-1 sangat baik sekitar 0,5, dengan skor di atas 0,5 dianggap baik dan 0,4 hingga 0,5 sedang. Untuk ROUGE-2, skor di atas 0,4 berarti baik, dan 0,2 hingga 0,4 berarti sedang.</a:t>
@@ -2087,110 +1933,101 @@
             </a:endParaRPr>
           </a:p>
           <a:p>
-            <a:pPr rtl="0">
-              <a:spcBef>
-                <a:spcPts val="1800"/>
-              </a:spcBef>
-              <a:spcAft>
-                <a:spcPts val="1800"/>
+            <a:pPr>
+              <a:spcBef>
+                <a:spcPts val="1903"/>
+              </a:spcBef>
+              <a:spcAft>
+                <a:spcPts val="1903"/>
               </a:spcAft>
             </a:pPr>
             <a:r>
-              <a:rPr lang="en-ID" sz="1800" b="0" i="0" u="none" strike="noStrike">
+              <a:rPr lang="en-ID" sz="1900">
                 <a:solidFill>
                   <a:srgbClr val="0A0A0A"/>
                 </a:solidFill>
-                <a:effectLst/>
                 <a:latin typeface="Arial" panose="020B0604020202020204" pitchFamily="34" charset="0"/>
               </a:rPr>
               <a:t>Skor ROUGE-L bagus sekitar 0,4 dan rendah pada 0,3 hingga 0,4. </a:t>
             </a:r>
           </a:p>
           <a:p>
-            <a:pPr rtl="0">
-              <a:spcBef>
-                <a:spcPts val="1800"/>
-              </a:spcBef>
-              <a:spcAft>
-                <a:spcPts val="1800"/>
+            <a:pPr>
+              <a:spcBef>
+                <a:spcPts val="1903"/>
+              </a:spcBef>
+              <a:spcAft>
+                <a:spcPts val="1903"/>
               </a:spcAft>
             </a:pPr>
             <a:r>
-              <a:rPr lang="en-ID" sz="1800" b="0" i="0" u="none" strike="noStrike">
+              <a:rPr lang="en-ID" sz="1900">
                 <a:solidFill>
                   <a:srgbClr val="0A0A0A"/>
                 </a:solidFill>
-                <a:effectLst/>
                 <a:latin typeface="Arial" panose="020B0604020202020204" pitchFamily="34" charset="0"/>
               </a:rPr>
               <a:t>Meskipun skor </a:t>
             </a:r>
             <a:r>
-              <a:rPr lang="en-ID" sz="1800" b="1" i="0" u="none" strike="noStrike">
+              <a:rPr lang="en-ID" sz="1900" b="1">
                 <a:solidFill>
                   <a:srgbClr val="0A0A0A"/>
                 </a:solidFill>
-                <a:effectLst/>
                 <a:latin typeface="Arial" panose="020B0604020202020204" pitchFamily="34" charset="0"/>
               </a:rPr>
               <a:t>ROUGE berguna</a:t>
             </a:r>
             <a:r>
-              <a:rPr lang="en-ID" sz="1800" b="0" i="0" u="none" strike="noStrike">
+              <a:rPr lang="en-ID" sz="1900">
                 <a:solidFill>
                   <a:srgbClr val="0A0A0A"/>
                 </a:solidFill>
-                <a:effectLst/>
                 <a:latin typeface="Arial" panose="020B0604020202020204" pitchFamily="34" charset="0"/>
               </a:rPr>
               <a:t>, skor tersebut tidak </a:t>
             </a:r>
             <a:r>
-              <a:rPr lang="en-ID" sz="1800" b="1" i="0" u="none" strike="noStrike">
+              <a:rPr lang="en-ID" sz="1900" b="1">
                 <a:solidFill>
                   <a:srgbClr val="0A0A0A"/>
                 </a:solidFill>
-                <a:effectLst/>
                 <a:latin typeface="Arial" panose="020B0604020202020204" pitchFamily="34" charset="0"/>
               </a:rPr>
               <a:t>memperhitungkan kualitas semantik </a:t>
             </a:r>
             <a:r>
-              <a:rPr lang="en-ID" sz="1800" b="0" i="0" u="none" strike="noStrike">
+              <a:rPr lang="en-ID" sz="1900">
                 <a:solidFill>
                   <a:srgbClr val="0A0A0A"/>
                 </a:solidFill>
-                <a:effectLst/>
                 <a:latin typeface="Arial" panose="020B0604020202020204" pitchFamily="34" charset="0"/>
               </a:rPr>
               <a:t>atau </a:t>
             </a:r>
             <a:r>
-              <a:rPr lang="en-ID" sz="1800" b="1" i="0" u="none" strike="noStrike">
+              <a:rPr lang="en-ID" sz="1900" b="1">
                 <a:solidFill>
                   <a:srgbClr val="0A0A0A"/>
                 </a:solidFill>
-                <a:effectLst/>
                 <a:latin typeface="Arial" panose="020B0604020202020204" pitchFamily="34" charset="0"/>
               </a:rPr>
               <a:t>sintaksis</a:t>
             </a:r>
             <a:r>
-              <a:rPr lang="en-ID" sz="1800" b="0" i="0" u="none" strike="noStrike">
+              <a:rPr lang="en-ID" sz="1900">
                 <a:solidFill>
                   <a:srgbClr val="0A0A0A"/>
                 </a:solidFill>
-                <a:effectLst/>
                 <a:latin typeface="Arial" panose="020B0604020202020204" pitchFamily="34" charset="0"/>
               </a:rPr>
               <a:t> dan harus dilengkapi dengan metrik lain dan </a:t>
             </a:r>
             <a:r>
-              <a:rPr lang="en-ID" sz="1800" b="1" i="0" u="none" strike="noStrike">
+              <a:rPr lang="en-ID" sz="1900" b="1">
                 <a:solidFill>
                   <a:srgbClr val="0A0A0A"/>
                 </a:solidFill>
-                <a:effectLst/>
                 <a:latin typeface="Arial" panose="020B0604020202020204" pitchFamily="34" charset="0"/>
               </a:rPr>
               <a:t>evaluasi manusia untuk penilaian yang lengkap.</a:t>
@@ -2243,8 +2080,8 @@
         </p:nvSpPr>
         <p:spPr>
           <a:xfrm>
-            <a:off x="381000" y="685800"/>
-            <a:ext cx="6096000" cy="3429000"/>
+            <a:off x="2714625" y="517525"/>
+            <a:ext cx="4591050" cy="2582863"/>
           </a:xfrm>
           <a:custGeom>
             <a:avLst/>
@@ -2284,26 +2121,20 @@
         </p:nvSpPr>
         <p:spPr>
           <a:xfrm>
-            <a:off x="685800" y="4343400"/>
-            <a:ext cx="5486400" cy="4114800"/>
+            <a:off x="1002030" y="3271878"/>
+            <a:ext cx="8016240" cy="3099673"/>
           </a:xfrm>
           <a:prstGeom prst="rect">
             <a:avLst/>
           </a:prstGeom>
         </p:spPr>
         <p:txBody>
-          <a:bodyPr spcFirstLastPara="1" wrap="square" lIns="91425" tIns="91425" rIns="91425" bIns="91425" anchor="t" anchorCtr="0">
+          <a:bodyPr spcFirstLastPara="1" wrap="square" lIns="96645" tIns="96645" rIns="96645" bIns="96645" anchor="t" anchorCtr="0">
             <a:noAutofit/>
           </a:bodyPr>
           <a:lstStyle/>
           <a:p>
-            <a:pPr marL="0" lvl="0" indent="0" algn="l" rtl="0">
-              <a:spcBef>
-                <a:spcPts val="0"/>
-              </a:spcBef>
-              <a:spcAft>
-                <a:spcPts val="0"/>
-              </a:spcAft>
+            <a:pPr marL="0" indent="0">
               <a:buNone/>
             </a:pPr>
             <a:endParaRPr/>
@@ -2347,8 +2178,8 @@
         </p:nvSpPr>
         <p:spPr>
           <a:xfrm>
-            <a:off x="381000" y="685800"/>
-            <a:ext cx="6096000" cy="3429000"/>
+            <a:off x="2714625" y="517525"/>
+            <a:ext cx="4591050" cy="2582863"/>
           </a:xfrm>
         </p:spPr>
       </p:sp>
@@ -2462,8 +2293,8 @@
         </p:nvSpPr>
         <p:spPr>
           <a:xfrm>
-            <a:off x="381000" y="685800"/>
-            <a:ext cx="6096000" cy="3429000"/>
+            <a:off x="2714625" y="517525"/>
+            <a:ext cx="4591050" cy="2582863"/>
           </a:xfrm>
         </p:spPr>
       </p:sp>
@@ -2488,6 +2319,72 @@
           <a:bodyPr/>
           <a:lstStyle/>
           <a:p>
+            <a:r>
+              <a:rPr lang="en-ID" b="1" i="0">
+                <a:solidFill>
+                  <a:srgbClr val="EEF0FF"/>
+                </a:solidFill>
+                <a:effectLst/>
+                <a:latin typeface="Google Sans" panose="020B0503030502040204" pitchFamily="34" charset="0"/>
+              </a:rPr>
+              <a:t>Chain-of-thought prompting (CoT) </a:t>
+            </a:r>
+            <a:r>
+              <a:rPr lang="en-ID" b="0" i="0">
+                <a:solidFill>
+                  <a:srgbClr val="EEF0FF"/>
+                </a:solidFill>
+                <a:effectLst/>
+                <a:latin typeface="Google Sans" panose="020B0503030502040204" pitchFamily="34" charset="0"/>
+              </a:rPr>
+              <a:t>adalah </a:t>
+            </a:r>
+            <a:r>
+              <a:rPr lang="en-ID"/>
+              <a:t>teknik yang membantu model bahasa besar (LLM) untuk berpikir selangkah demi selangkah, seperti manusia</a:t>
+            </a:r>
+            <a:r>
+              <a:rPr lang="en-ID" b="0" i="0">
+                <a:solidFill>
+                  <a:srgbClr val="EEF0FF"/>
+                </a:solidFill>
+                <a:effectLst/>
+                <a:latin typeface="Google Sans" panose="020B0503030502040204" pitchFamily="34" charset="0"/>
+              </a:rPr>
+              <a:t>.</a:t>
+            </a:r>
+          </a:p>
+          <a:p>
+            <a:r>
+              <a:rPr lang="en-ID" b="0" i="0">
+                <a:solidFill>
+                  <a:srgbClr val="E8E8E8"/>
+                </a:solidFill>
+                <a:effectLst/>
+                <a:latin typeface="Google Sans" panose="020B0503030502040204" pitchFamily="34" charset="0"/>
+              </a:rPr>
+              <a:t>Pemberian petunjuk Rantai Pemikiran (CoT) adalah </a:t>
+            </a:r>
+            <a:r>
+              <a:rPr lang="en-ID" b="0" i="0">
+                <a:solidFill>
+                  <a:srgbClr val="FFFFFF"/>
+                </a:solidFill>
+                <a:effectLst/>
+                <a:latin typeface="Google Sans" panose="020B0503030502040204" pitchFamily="34" charset="0"/>
+              </a:rPr>
+              <a:t>teknik yang memandu LLM untuk mengikuti proses penalaran saat menghadapi masalah yang sulit</a:t>
+            </a:r>
+            <a:r>
+              <a:rPr lang="en-ID" b="0" i="0">
+                <a:solidFill>
+                  <a:srgbClr val="E8E8E8"/>
+                </a:solidFill>
+                <a:effectLst/>
+                <a:latin typeface="Google Sans" panose="020B0503030502040204" pitchFamily="34" charset="0"/>
+              </a:rPr>
+              <a:t>.</a:t>
+            </a:r>
             <a:endParaRPr lang="en-ID"/>
           </a:p>
         </p:txBody>
@@ -2546,8 +2443,8 @@
         </p:nvSpPr>
         <p:spPr>
           <a:xfrm>
-            <a:off x="381000" y="685800"/>
-            <a:ext cx="6096000" cy="3429000"/>
+            <a:off x="2714625" y="517525"/>
+            <a:ext cx="4591050" cy="2582863"/>
           </a:xfrm>
         </p:spPr>
       </p:sp>
@@ -2630,8 +2527,8 @@
         </p:nvSpPr>
         <p:spPr>
           <a:xfrm>
-            <a:off x="381000" y="685800"/>
-            <a:ext cx="6096000" cy="3429000"/>
+            <a:off x="2714625" y="517525"/>
+            <a:ext cx="4591050" cy="2582863"/>
           </a:xfrm>
           <a:custGeom>
             <a:avLst/>
@@ -2677,26 +2574,20 @@
         </p:nvSpPr>
         <p:spPr>
           <a:xfrm>
-            <a:off x="685800" y="4343400"/>
-            <a:ext cx="5486400" cy="4114800"/>
+            <a:off x="1002030" y="3271878"/>
+            <a:ext cx="8016240" cy="3099673"/>
           </a:xfrm>
           <a:prstGeom prst="rect">
             <a:avLst/>
           </a:prstGeom>
         </p:spPr>
         <p:txBody>
-          <a:bodyPr spcFirstLastPara="1" wrap="square" lIns="91425" tIns="91425" rIns="91425" bIns="91425" anchor="t" anchorCtr="0">
+          <a:bodyPr spcFirstLastPara="1" wrap="square" lIns="96645" tIns="96645" rIns="96645" bIns="96645" anchor="t" anchorCtr="0">
             <a:noAutofit/>
           </a:bodyPr>
           <a:lstStyle/>
           <a:p>
-            <a:pPr marL="0" lvl="0" indent="0" algn="l" rtl="0">
-              <a:spcBef>
-                <a:spcPts val="0"/>
-              </a:spcBef>
-              <a:spcAft>
-                <a:spcPts val="0"/>
-              </a:spcAft>
+            <a:pPr marL="0" indent="0">
               <a:buNone/>
             </a:pPr>
             <a:endParaRPr/>
@@ -2757,8 +2648,8 @@
         </p:nvSpPr>
         <p:spPr>
           <a:xfrm>
-            <a:off x="381000" y="685800"/>
-            <a:ext cx="6096000" cy="3429000"/>
+            <a:off x="2714625" y="517525"/>
+            <a:ext cx="4591050" cy="2582863"/>
           </a:xfrm>
         </p:spPr>
       </p:sp>
@@ -2841,8 +2732,8 @@
         </p:nvSpPr>
         <p:spPr>
           <a:xfrm>
-            <a:off x="381000" y="685800"/>
-            <a:ext cx="6096000" cy="3429000"/>
+            <a:off x="2714625" y="517525"/>
+            <a:ext cx="4591050" cy="2582863"/>
           </a:xfrm>
         </p:spPr>
       </p:sp>
@@ -2913,8 +2804,8 @@
         </p:nvSpPr>
         <p:spPr>
           <a:xfrm>
-            <a:off x="381000" y="685800"/>
-            <a:ext cx="6096000" cy="3429000"/>
+            <a:off x="2714625" y="517525"/>
+            <a:ext cx="4591050" cy="2582863"/>
           </a:xfrm>
           <a:custGeom>
             <a:avLst/>
@@ -2954,26 +2845,20 @@
         </p:nvSpPr>
         <p:spPr>
           <a:xfrm>
-            <a:off x="685800" y="4343400"/>
-            <a:ext cx="5486400" cy="4114800"/>
+            <a:off x="1002030" y="3271878"/>
+            <a:ext cx="8016240" cy="3099673"/>
           </a:xfrm>
           <a:prstGeom prst="rect">
             <a:avLst/>
           </a:prstGeom>
         </p:spPr>
         <p:txBody>
-          <a:bodyPr spcFirstLastPara="1" wrap="square" lIns="91425" tIns="91425" rIns="91425" bIns="91425" anchor="t" anchorCtr="0">
+          <a:bodyPr spcFirstLastPara="1" wrap="square" lIns="96645" tIns="96645" rIns="96645" bIns="96645" anchor="t" anchorCtr="0">
             <a:noAutofit/>
           </a:bodyPr>
           <a:lstStyle/>
           <a:p>
-            <a:pPr marL="0" lvl="0" indent="0" algn="l" rtl="0">
-              <a:spcBef>
-                <a:spcPts val="0"/>
-              </a:spcBef>
-              <a:spcAft>
-                <a:spcPts val="0"/>
-              </a:spcAft>
+            <a:pPr marL="0" indent="0">
               <a:buNone/>
             </a:pPr>
             <a:endParaRPr/>
@@ -3029,8 +2914,8 @@
         </p:nvSpPr>
         <p:spPr>
           <a:xfrm>
-            <a:off x="381000" y="685800"/>
-            <a:ext cx="6096000" cy="3429000"/>
+            <a:off x="2714625" y="517525"/>
+            <a:ext cx="4591050" cy="2582863"/>
           </a:xfrm>
           <a:custGeom>
             <a:avLst/>
@@ -3076,26 +2961,20 @@
         </p:nvSpPr>
         <p:spPr>
           <a:xfrm>
-            <a:off x="685800" y="4343400"/>
-            <a:ext cx="5486400" cy="4114800"/>
+            <a:off x="1002030" y="3271878"/>
+            <a:ext cx="8016240" cy="3099673"/>
           </a:xfrm>
           <a:prstGeom prst="rect">
             <a:avLst/>
           </a:prstGeom>
         </p:spPr>
         <p:txBody>
-          <a:bodyPr spcFirstLastPara="1" wrap="square" lIns="91425" tIns="91425" rIns="91425" bIns="91425" anchor="t" anchorCtr="0">
+          <a:bodyPr spcFirstLastPara="1" wrap="square" lIns="96645" tIns="96645" rIns="96645" bIns="96645" anchor="t" anchorCtr="0">
             <a:noAutofit/>
           </a:bodyPr>
           <a:lstStyle/>
           <a:p>
-            <a:pPr marL="0" lvl="0" indent="0" algn="l" rtl="0">
-              <a:spcBef>
-                <a:spcPts val="0"/>
-              </a:spcBef>
-              <a:spcAft>
-                <a:spcPts val="0"/>
-              </a:spcAft>
+            <a:pPr marL="0" indent="0">
               <a:buNone/>
             </a:pPr>
             <a:endParaRPr/>
@@ -3144,8 +3023,8 @@
         </p:nvSpPr>
         <p:spPr>
           <a:xfrm>
-            <a:off x="381000" y="685800"/>
-            <a:ext cx="6096000" cy="3429000"/>
+            <a:off x="2714625" y="517525"/>
+            <a:ext cx="4591050" cy="2582863"/>
           </a:xfrm>
           <a:custGeom>
             <a:avLst/>
@@ -3185,26 +3064,20 @@
         </p:nvSpPr>
         <p:spPr>
           <a:xfrm>
-            <a:off x="685800" y="4343400"/>
-            <a:ext cx="5486400" cy="4114800"/>
+            <a:off x="1002030" y="3271878"/>
+            <a:ext cx="8016240" cy="3099673"/>
           </a:xfrm>
           <a:prstGeom prst="rect">
             <a:avLst/>
           </a:prstGeom>
         </p:spPr>
         <p:txBody>
-          <a:bodyPr spcFirstLastPara="1" wrap="square" lIns="91425" tIns="91425" rIns="91425" bIns="91425" anchor="t" anchorCtr="0">
+          <a:bodyPr spcFirstLastPara="1" wrap="square" lIns="96645" tIns="96645" rIns="96645" bIns="96645" anchor="t" anchorCtr="0">
             <a:noAutofit/>
           </a:bodyPr>
           <a:lstStyle/>
           <a:p>
-            <a:pPr marL="0" lvl="0" indent="0" algn="l" rtl="0">
-              <a:spcBef>
-                <a:spcPts val="0"/>
-              </a:spcBef>
-              <a:spcAft>
-                <a:spcPts val="0"/>
-              </a:spcAft>
+            <a:pPr marL="0" indent="0">
               <a:buNone/>
             </a:pPr>
             <a:endParaRPr/>
@@ -3248,8 +3121,8 @@
         </p:nvSpPr>
         <p:spPr>
           <a:xfrm>
-            <a:off x="381000" y="685800"/>
-            <a:ext cx="6096000" cy="3429000"/>
+            <a:off x="2714625" y="517525"/>
+            <a:ext cx="4591050" cy="2582863"/>
           </a:xfrm>
         </p:spPr>
       </p:sp>
@@ -3422,8 +3295,8 @@
         </p:nvSpPr>
         <p:spPr>
           <a:xfrm>
-            <a:off x="381000" y="685800"/>
-            <a:ext cx="6096000" cy="3429000"/>
+            <a:off x="2714625" y="517525"/>
+            <a:ext cx="4591050" cy="2582863"/>
           </a:xfrm>
           <a:custGeom>
             <a:avLst/>
@@ -3469,26 +3342,20 @@
         </p:nvSpPr>
         <p:spPr>
           <a:xfrm>
-            <a:off x="685800" y="4343400"/>
-            <a:ext cx="5486400" cy="4114800"/>
+            <a:off x="1002030" y="3271878"/>
+            <a:ext cx="8016240" cy="3099673"/>
           </a:xfrm>
           <a:prstGeom prst="rect">
             <a:avLst/>
           </a:prstGeom>
         </p:spPr>
         <p:txBody>
-          <a:bodyPr spcFirstLastPara="1" wrap="square" lIns="91425" tIns="91425" rIns="91425" bIns="91425" anchor="t" anchorCtr="0">
+          <a:bodyPr spcFirstLastPara="1" wrap="square" lIns="96645" tIns="96645" rIns="96645" bIns="96645" anchor="t" anchorCtr="0">
             <a:noAutofit/>
           </a:bodyPr>
           <a:lstStyle/>
           <a:p>
-            <a:pPr marL="0" lvl="0" indent="0" algn="l" rtl="0">
-              <a:spcBef>
-                <a:spcPts val="0"/>
-              </a:spcBef>
-              <a:spcAft>
-                <a:spcPts val="0"/>
-              </a:spcAft>
+            <a:pPr marL="0" indent="0">
               <a:buNone/>
             </a:pPr>
             <a:endParaRPr/>
@@ -3549,8 +3416,8 @@
         </p:nvSpPr>
         <p:spPr>
           <a:xfrm>
-            <a:off x="381000" y="685800"/>
-            <a:ext cx="6096000" cy="3429000"/>
+            <a:off x="2714625" y="517525"/>
+            <a:ext cx="4591050" cy="2582863"/>
           </a:xfrm>
           <a:custGeom>
             <a:avLst/>
@@ -3596,26 +3463,20 @@
         </p:nvSpPr>
         <p:spPr>
           <a:xfrm>
-            <a:off x="685800" y="4343400"/>
-            <a:ext cx="5486400" cy="4114800"/>
+            <a:off x="1002030" y="3271878"/>
+            <a:ext cx="8016240" cy="3099673"/>
           </a:xfrm>
           <a:prstGeom prst="rect">
             <a:avLst/>
           </a:prstGeom>
         </p:spPr>
         <p:txBody>
-          <a:bodyPr spcFirstLastPara="1" wrap="square" lIns="91425" tIns="91425" rIns="91425" bIns="91425" anchor="t" anchorCtr="0">
+          <a:bodyPr spcFirstLastPara="1" wrap="square" lIns="96645" tIns="96645" rIns="96645" bIns="96645" anchor="t" anchorCtr="0">
             <a:noAutofit/>
           </a:bodyPr>
           <a:lstStyle/>
           <a:p>
-            <a:pPr marL="0" lvl="0" indent="0" algn="l" rtl="0">
-              <a:spcBef>
-                <a:spcPts val="0"/>
-              </a:spcBef>
-              <a:spcAft>
-                <a:spcPts val="0"/>
-              </a:spcAft>
+            <a:pPr marL="0" indent="0">
               <a:buNone/>
             </a:pPr>
             <a:endParaRPr/>
@@ -3664,8 +3525,8 @@
         </p:nvSpPr>
         <p:spPr>
           <a:xfrm>
-            <a:off x="381000" y="685800"/>
-            <a:ext cx="6096000" cy="3429000"/>
+            <a:off x="2714625" y="517525"/>
+            <a:ext cx="4591050" cy="2582863"/>
           </a:xfrm>
         </p:spPr>
       </p:sp>
@@ -3733,8 +3594,8 @@
         </p:nvSpPr>
         <p:spPr>
           <a:xfrm>
-            <a:off x="381000" y="685800"/>
-            <a:ext cx="6096000" cy="3429000"/>
+            <a:off x="2714625" y="517525"/>
+            <a:ext cx="4591050" cy="2582863"/>
           </a:xfrm>
         </p:spPr>
       </p:sp>
@@ -15606,7 +15467,22 @@
                 <a:latin typeface="Times New Roman" panose="02020603050405020304" pitchFamily="18" charset="0"/>
                 <a:ea typeface="Times New Roman" panose="02020603050405020304" pitchFamily="18" charset="0"/>
               </a:rPr>
-              <a:t>Salah satu aplikasi chatbot yang umum digunakan dan populer saat ini adalah ChatGPT yang dikembangkan oleh OpenAI dan dirilis pada akhir tahun 2022 (Mohamadi et al., 2023). Berbagai penelitian berupaya mengeksplorasi kemampuan ChatGPT seperti yang dilakukan oleh Baker dkk. (2024) dalam bidang medis yang dikembangkan untuk membantu dokumentasi klinis.</a:t>
+              <a:t>Salah satu aplikasi chatbot yang umum digunakan dan populer saat ini adalah ChatGPT yang dikembangkan oleh OpenAI dan dirilis pada akhir tahun 2022 (Mohamadi </a:t>
+            </a:r>
+            <a:r>
+              <a:rPr lang="en-GB" sz="1800">
+                <a:latin typeface="Times New Roman" panose="02020603050405020304" pitchFamily="18" charset="0"/>
+                <a:ea typeface="Times New Roman" panose="02020603050405020304" pitchFamily="18" charset="0"/>
+              </a:rPr>
+              <a:t>dkk</a:t>
+            </a:r>
+            <a:r>
+              <a:rPr lang="en-GB" sz="1800">
+                <a:effectLst/>
+                <a:latin typeface="Times New Roman" panose="02020603050405020304" pitchFamily="18" charset="0"/>
+                <a:ea typeface="Times New Roman" panose="02020603050405020304" pitchFamily="18" charset="0"/>
+              </a:rPr>
+              <a:t>l., 2023). Berbagai penelitian berupaya mengeksplorasi kemampuan ChatGPT seperti yang dilakukan oleh Baker dkk. (2024) dalam bidang medis yang dikembangkan untuk membantu dokumentasi klinis.</a:t>
             </a:r>
             <a:endParaRPr lang="en-ID" sz="1800">
               <a:solidFill>
@@ -15781,7 +15657,7 @@
                 <a:latin typeface="Lexend"/>
                 <a:sym typeface="Lexend"/>
               </a:rPr>
-              <a:t>Seminar Hasil Tesis | Selasa, 27 Agustus 2024</a:t>
+              <a:t>Seminar Hasil Tesis | Kamis, 22 Agustus 2024</a:t>
             </a:r>
             <a:endParaRPr lang="en-ID" sz="1200" dirty="0">
               <a:solidFill>
@@ -16294,7 +16170,39 @@
                 <a:latin typeface="Times New Roman" panose="02020603050405020304" pitchFamily="18" charset="0"/>
                 <a:ea typeface="Times New Roman" panose="02020603050405020304" pitchFamily="18" charset="0"/>
               </a:rPr>
-              <a:t> pada LLM Llama 7B yang diberi nama “Ophtha-LLaMA2” untuk membantu mendiagnosis penyakit mata yang akan memberikan dukungan keputusan bagi dokter</a:t>
+              <a:t> pada LLM </a:t>
+            </a:r>
+            <a:r>
+              <a:rPr lang="en-GB" sz="1800" b="1">
+                <a:effectLst/>
+                <a:latin typeface="Times New Roman" panose="02020603050405020304" pitchFamily="18" charset="0"/>
+                <a:ea typeface="Times New Roman" panose="02020603050405020304" pitchFamily="18" charset="0"/>
+              </a:rPr>
+              <a:t>Llama 7B </a:t>
+            </a:r>
+            <a:r>
+              <a:rPr lang="en-GB" sz="1800">
+                <a:effectLst/>
+                <a:latin typeface="Times New Roman" panose="02020603050405020304" pitchFamily="18" charset="0"/>
+                <a:ea typeface="Times New Roman" panose="02020603050405020304" pitchFamily="18" charset="0"/>
+              </a:rPr>
+              <a:t>yang diberi nama “</a:t>
+            </a:r>
+            <a:r>
+              <a:rPr lang="en-GB" sz="1800" b="1">
+                <a:effectLst/>
+                <a:latin typeface="Times New Roman" panose="02020603050405020304" pitchFamily="18" charset="0"/>
+                <a:ea typeface="Times New Roman" panose="02020603050405020304" pitchFamily="18" charset="0"/>
+              </a:rPr>
+              <a:t>Ophtha-LLaMA2</a:t>
+            </a:r>
+            <a:r>
+              <a:rPr lang="en-GB" sz="1800">
+                <a:effectLst/>
+                <a:latin typeface="Times New Roman" panose="02020603050405020304" pitchFamily="18" charset="0"/>
+                <a:ea typeface="Times New Roman" panose="02020603050405020304" pitchFamily="18" charset="0"/>
+              </a:rPr>
+              <a:t>” untuk membantu mendiagnosis penyakit mata yang akan memberikan dukungan keputusan bagi dokter</a:t>
             </a:r>
             <a:r>
               <a:rPr lang="en-ID" sz="1800">
@@ -16382,7 +16290,7 @@
                 <a:latin typeface="Lexend"/>
                 <a:sym typeface="Lexend"/>
               </a:rPr>
-              <a:t>Seminar Hasil Tesis | Selasa, 27 Agustus 2024</a:t>
+              <a:t>Seminar Hasil Tesis | Kamis, 22 Agustus 2024</a:t>
             </a:r>
             <a:endParaRPr lang="en-ID" sz="1200" dirty="0">
               <a:solidFill>
@@ -16875,7 +16783,7 @@
                 <a:latin typeface="Lexend"/>
                 <a:sym typeface="Lexend"/>
               </a:rPr>
-              <a:t>Seminar Hasil Tesis | Selasa, 27 Agustus 2024</a:t>
+              <a:t>Seminar Hasil Tesis | Kamis, 22 Agustus 2024</a:t>
             </a:r>
             <a:endParaRPr lang="en-ID" sz="1200" dirty="0">
               <a:solidFill>
@@ -18660,7 +18568,7 @@
                 <a:latin typeface="Lexend"/>
                 <a:sym typeface="Lexend"/>
               </a:rPr>
-              <a:t>Seminar Hasil Tesis | Selasa, 27 Agustus 2024</a:t>
+              <a:t>Seminar Hasil Tesis | Kamis, 22 Agustus 2024</a:t>
             </a:r>
             <a:endParaRPr lang="en-ID" sz="1600" dirty="0">
               <a:solidFill>
@@ -19069,7 +18977,7 @@
                 <a:latin typeface="Lexend"/>
                 <a:sym typeface="Lexend"/>
               </a:rPr>
-              <a:t>Seminar Hasil Tesis | Selasa, 27 Agustus 2024</a:t>
+              <a:t>Seminar Hasil Tesis | Kamis, 22 Agustus 2024</a:t>
             </a:r>
             <a:endParaRPr lang="en-ID" sz="1200" dirty="0">
               <a:solidFill>
@@ -19549,7 +19457,7 @@
                 <a:latin typeface="Lexend"/>
                 <a:sym typeface="Lexend"/>
               </a:rPr>
-              <a:t>Seminar Hasil Tesis | Selasa, 27 Agustus 2024</a:t>
+              <a:t>Seminar Hasil Tesis | Kamis, 22 Agustus 2024</a:t>
             </a:r>
             <a:endParaRPr lang="en-ID" sz="1200" dirty="0">
               <a:solidFill>
@@ -19861,7 +19769,7 @@
             </a:r>
             <a:r>
               <a:rPr lang="nl-NL" sz="1400"/>
-              <a:t> dan </a:t>
+              <a:t>  dan </a:t>
             </a:r>
             <a:r>
               <a:rPr lang="nl-NL" sz="1400" b="1" i="1"/>
@@ -20378,7 +20286,7 @@
                 <a:latin typeface="Lexend"/>
                 <a:sym typeface="Lexend"/>
               </a:rPr>
-              <a:t>Seminar Hasil Tesis | Selasa, 27 Agustus 2024</a:t>
+              <a:t>Seminar Hasil Tesis | Kamis, 22 Agustus 2024</a:t>
             </a:r>
             <a:endParaRPr lang="en-ID" sz="1200" dirty="0">
               <a:solidFill>
@@ -21172,7 +21080,7 @@
                 <a:latin typeface="Lexend"/>
                 <a:sym typeface="Lexend"/>
               </a:rPr>
-              <a:t>Seminar Hasil Tesis | Selasa, 27 Agustus 2024</a:t>
+              <a:t>Seminar Hasil Tesis | Kamis, 22 Agustus 2024</a:t>
             </a:r>
             <a:endParaRPr lang="en-ID" sz="1200" dirty="0">
               <a:solidFill>
@@ -22987,7 +22895,7 @@
                 <a:latin typeface="Lexend"/>
                 <a:sym typeface="Lexend"/>
               </a:rPr>
-              <a:t>Seminar Hasil Tesis | Selasa, 27 Agustus 2024</a:t>
+              <a:t>Seminar Hasil Tesis | Kamis, 22 Agustus 2024</a:t>
             </a:r>
             <a:endParaRPr lang="en-ID" sz="1600" dirty="0">
               <a:solidFill>
@@ -23141,7 +23049,7 @@
                 <a:latin typeface="Lexend"/>
                 <a:sym typeface="Lexend"/>
               </a:rPr>
-              <a:t>Seminar Hasil Tesis | Selasa, 27 Agustus 2024</a:t>
+              <a:t>Seminar Hasil Tesis | Kamis, 22 Agustus 2024</a:t>
             </a:r>
             <a:endParaRPr lang="en-ID" sz="1200" dirty="0">
               <a:solidFill>
@@ -25320,7 +25228,7 @@
                 <a:latin typeface="Lexend"/>
                 <a:sym typeface="Lexend"/>
               </a:rPr>
-              <a:t>Seminar Hasil Tesis | Selasa, 27 Agustus 2024</a:t>
+              <a:t>Seminar Hasil Tesis | Kamis, 22 Agustus 2024</a:t>
             </a:r>
             <a:endParaRPr lang="en-ID" sz="1200" dirty="0">
               <a:solidFill>
@@ -25469,7 +25377,7 @@
                 <a:latin typeface="Lexend"/>
                 <a:sym typeface="Lexend"/>
               </a:rPr>
-              <a:t>Seminar Hasil Tesis | Selasa, 27 Agustus 2024</a:t>
+              <a:t>Seminar Hasil Tesis | Kamis, 22 Agustus 2024</a:t>
             </a:r>
             <a:endParaRPr lang="en-ID" sz="1200" dirty="0">
               <a:solidFill>
@@ -26577,7 +26485,7 @@
                 <a:latin typeface="Lexend"/>
                 <a:sym typeface="Lexend"/>
               </a:rPr>
-              <a:t>Seminar Hasil Tesis | Selasa, 27 Agustus 2024</a:t>
+              <a:t>Seminar Hasil Tesis | Kamis, 22 Agustus 2024</a:t>
             </a:r>
             <a:endParaRPr lang="en-ID" sz="1200" dirty="0">
               <a:solidFill>
@@ -27765,7 +27673,7 @@
                 <a:latin typeface="Lexend"/>
                 <a:sym typeface="Lexend"/>
               </a:rPr>
-              <a:t>Seminar Hasil Tesis | Selasa, 27 Agustus 2024</a:t>
+              <a:t>Seminar Hasil Tesis | Kamis, 22 Agustus 2024</a:t>
             </a:r>
             <a:endParaRPr lang="en-ID" sz="1200" dirty="0">
               <a:solidFill>
@@ -29830,7 +29738,7 @@
                 <a:latin typeface="Lexend"/>
                 <a:sym typeface="Lexend"/>
               </a:rPr>
-              <a:t>Seminar Hasil Tesis | Selasa, 27 Agustus 2024</a:t>
+              <a:t>Seminar Hasil Tesis | Kamis, 22 Agustus 2024</a:t>
             </a:r>
             <a:endParaRPr lang="en-ID" sz="1200" dirty="0">
               <a:solidFill>
@@ -30316,7 +30224,7 @@
                 <a:latin typeface="Lexend"/>
                 <a:sym typeface="Lexend"/>
               </a:rPr>
-              <a:t>Seminar Hasil Tesis | Selasa, 27 Agustus 2024</a:t>
+              <a:t>Seminar Hasil Tesis | Kamis, 22 Agustus 2024</a:t>
             </a:r>
             <a:endParaRPr lang="en-ID" sz="1200" dirty="0">
               <a:solidFill>
@@ -30802,7 +30710,7 @@
                 <a:latin typeface="Lexend"/>
                 <a:sym typeface="Lexend"/>
               </a:rPr>
-              <a:t>Seminar Hasil Tesis | Selasa, 27 Agustus 2024</a:t>
+              <a:t>Seminar Hasil Tesis | Kamis, 22 Agustus 2024</a:t>
             </a:r>
             <a:endParaRPr lang="en-ID" sz="1200" dirty="0">
               <a:solidFill>
@@ -31089,7 +30997,7 @@
                 <a:latin typeface="Lexend" pitchFamily="2" charset="0"/>
                 <a:ea typeface="Calibri" panose="020F0502020204030204" pitchFamily="34" charset="0"/>
               </a:rPr>
-              <a:t>Gambar 4.3 </a:t>
+              <a:t>Gambar 4.3 Alur </a:t>
             </a:r>
             <a:r>
               <a:rPr lang="en-US" sz="1600">
@@ -31288,7 +31196,7 @@
                 <a:latin typeface="Lexend"/>
                 <a:sym typeface="Lexend"/>
               </a:rPr>
-              <a:t>Seminar Hasil Tesis | Selasa, 27 Agustus 2024</a:t>
+              <a:t>Seminar Hasil Tesis | Kamis, 22 Agustus 2024</a:t>
             </a:r>
             <a:endParaRPr lang="en-ID" sz="1200" dirty="0">
               <a:solidFill>
@@ -32723,7 +32631,7 @@
                 <a:latin typeface="Lexend"/>
                 <a:sym typeface="Lexend"/>
               </a:rPr>
-              <a:t>Seminar Hasil Tesis | Selasa, 27 Agustus 2024</a:t>
+              <a:t>Seminar Hasil Tesis | Kamis, 22 Agustus 2024</a:t>
             </a:r>
             <a:endParaRPr lang="en-ID" sz="1200" dirty="0">
               <a:solidFill>
@@ -33262,8 +33170,8 @@
           </a:p>
         </p:txBody>
       </p:sp>
-      <mc:AlternateContent xmlns:mc="http://schemas.openxmlformats.org/markup-compatibility/2006">
-        <mc:Choice xmlns:a14="http://schemas.microsoft.com/office/drawing/2010/main" Requires="a14">
+      <mc:AlternateContent xmlns:mc="http://schemas.openxmlformats.org/markup-compatibility/2006" xmlns:a14="http://schemas.microsoft.com/office/drawing/2010/main">
+        <mc:Choice Requires="a14">
           <p:graphicFrame>
             <p:nvGraphicFramePr>
               <p:cNvPr id="20" name="Table 19">
@@ -33816,7 +33724,7 @@
             </a:graphic>
           </p:graphicFrame>
         </mc:Choice>
-        <mc:Fallback>
+        <mc:Fallback xmlns="">
           <p:graphicFrame>
             <p:nvGraphicFramePr>
               <p:cNvPr id="20" name="Table 19">
@@ -34158,7 +34066,7 @@
                 <a:latin typeface="Lexend"/>
                 <a:sym typeface="Lexend"/>
               </a:rPr>
-              <a:t>Seminar Hasil Tesis | Selasa, 27 Agustus 2024</a:t>
+              <a:t>Seminar Hasil Tesis | Kamis, 22 Agustus 2024</a:t>
             </a:r>
             <a:endParaRPr lang="en-ID" sz="1200" dirty="0">
               <a:solidFill>
@@ -37066,7 +36974,7 @@
                 <a:latin typeface="Lexend"/>
                 <a:sym typeface="Lexend"/>
               </a:rPr>
-              <a:t>Seminar Hasil Tesis | Selasa, 27 Agustus 2024</a:t>
+              <a:t>Seminar Hasil Tesis | Kamis, 22 Agustus 2024</a:t>
             </a:r>
             <a:endParaRPr lang="en-ID" sz="1600" dirty="0">
               <a:solidFill>
@@ -37634,7 +37542,7 @@
                 <a:latin typeface="Lexend"/>
                 <a:sym typeface="Lexend"/>
               </a:rPr>
-              <a:t>Seminar Hasil Tesis | Selasa, 27 Agustus 2024</a:t>
+              <a:t>Seminar Hasil Tesis | Kamis, 22 Agustus 2024</a:t>
             </a:r>
             <a:endParaRPr lang="en-ID" sz="1200" dirty="0">
               <a:solidFill>
@@ -37788,7 +37696,7 @@
                 <a:latin typeface="Lexend"/>
                 <a:sym typeface="Lexend"/>
               </a:rPr>
-              <a:t>Seminar Hasil Tesis | Selasa, 27 Agustus 2024</a:t>
+              <a:t>Seminar Hasil Tesis | Kamis, 22 Agustus 2024</a:t>
             </a:r>
             <a:endParaRPr lang="en-ID" sz="1200" dirty="0">
               <a:solidFill>
@@ -39065,7 +38973,7 @@
                 <a:latin typeface="Lexend"/>
                 <a:sym typeface="Lexend"/>
               </a:rPr>
-              <a:t>Seminar Hasil Tesis | Selasa, 27 Agustus 2024</a:t>
+              <a:t>Seminar Hasil Tesis | Kamis, 22 Agustus 2024</a:t>
             </a:r>
             <a:endParaRPr lang="en-ID" sz="1200" dirty="0">
               <a:solidFill>
@@ -40336,7 +40244,7 @@
                 <a:latin typeface="Lexend"/>
                 <a:sym typeface="Lexend"/>
               </a:rPr>
-              <a:t>Seminar Hasil Tesis | Selasa, 27 Agustus 2024</a:t>
+              <a:t>Seminar Hasil Tesis | Kamis, 22 Agustus 2024</a:t>
             </a:r>
             <a:endParaRPr lang="en-ID" sz="1200" dirty="0">
               <a:solidFill>
@@ -41484,7 +41392,7 @@
                 <a:latin typeface="Lexend"/>
                 <a:sym typeface="Lexend"/>
               </a:rPr>
-              <a:t>Seminar Hasil Tesis | Selasa, 27 Agustus 2024</a:t>
+              <a:t>Seminar Hasil Tesis | Kamis, 22 Agustus 2024</a:t>
             </a:r>
             <a:endParaRPr lang="en-ID" sz="1200" dirty="0">
               <a:solidFill>
@@ -42098,7 +42006,7 @@
           <a:p>
             <a:r>
               <a:rPr lang="en-US"/>
-              <a:t>Hasil dan Pembahasan (4/6)</a:t>
+              <a:t>Hasil dan Pembahasan (5/6)</a:t>
             </a:r>
             <a:endParaRPr lang="en-ID"/>
           </a:p>
@@ -42249,7 +42157,7 @@
                 <a:latin typeface="Lexend"/>
                 <a:sym typeface="Lexend"/>
               </a:rPr>
-              <a:t>Seminar Hasil Tesis | Selasa, 27 Agustus 2024</a:t>
+              <a:t>Seminar Hasil Tesis | Kamis, 22 Agustus 2024</a:t>
             </a:r>
             <a:endParaRPr lang="en-ID" sz="1200" dirty="0">
               <a:solidFill>
@@ -43014,7 +42922,7 @@
                 <a:latin typeface="Lexend"/>
                 <a:sym typeface="Lexend"/>
               </a:rPr>
-              <a:t>Seminar Hasil Tesis | Selasa, 27 Agustus 2024</a:t>
+              <a:t>Seminar Hasil Tesis | Kamis, 22 Agustus 2024</a:t>
             </a:r>
             <a:endParaRPr lang="en-ID" sz="1200" dirty="0">
               <a:solidFill>
@@ -45097,7 +45005,7 @@
                 <a:latin typeface="Lexend"/>
                 <a:sym typeface="Lexend"/>
               </a:rPr>
-              <a:t>Seminar Hasil Tesis | Selasa, 27 Agustus 2024</a:t>
+              <a:t>Seminar Hasil Tesis | Kamis, 22 Agustus 2024</a:t>
             </a:r>
             <a:endParaRPr lang="en-ID" sz="1600" dirty="0">
               <a:solidFill>
@@ -45356,7 +45264,7 @@
                 <a:latin typeface="Lexend"/>
                 <a:sym typeface="Lexend"/>
               </a:rPr>
-              <a:t>Seminar Hasil Tesis | Selasa, 27 Agustus 2024</a:t>
+              <a:t>Seminar Hasil Tesis | Kamis, 22 Agustus 2024</a:t>
             </a:r>
             <a:endParaRPr lang="en-ID" sz="1200" dirty="0">
               <a:solidFill>
@@ -45672,7 +45580,7 @@
           <a:p>
             <a:r>
               <a:rPr lang="en-US"/>
-              <a:t>Kesimpulan (1/3)</a:t>
+              <a:t>Saran (2/2)</a:t>
             </a:r>
             <a:endParaRPr lang="en-ID"/>
           </a:p>
@@ -45855,7 +45763,7 @@
                 <a:latin typeface="Lexend"/>
                 <a:sym typeface="Lexend"/>
               </a:rPr>
-              <a:t>Seminar Hasil Tesis | Selasa, 27 Agustus 2024</a:t>
+              <a:t>Seminar Hasil Tesis | Kamis, 22 Agustus 2024</a:t>
             </a:r>
             <a:endParaRPr lang="en-ID" sz="1200" dirty="0">
               <a:solidFill>
@@ -49215,7 +49123,7 @@
                 <a:latin typeface="Lexend"/>
                 <a:sym typeface="Lexend"/>
               </a:rPr>
-              <a:t>Seminar Hasil Tesis | Selasa, 27 Agustus 2024</a:t>
+              <a:t>Seminar Hasil Tesis | Kamis, 22 Agustus 2024</a:t>
             </a:r>
             <a:endParaRPr lang="en-ID" sz="1600" dirty="0">
               <a:solidFill>
@@ -49336,7 +49244,7 @@
                 <a:latin typeface="Times New Roman" panose="02020603050405020304" pitchFamily="18" charset="0"/>
                 <a:ea typeface="Calibri" panose="020F0502020204030204" pitchFamily="34" charset="0"/>
               </a:rPr>
-              <a:t>, maka dapat  dirumuskan beberapa permasalahan dasar yang sederhana dan umum ditemukan, sehingga didapatkan rumusan masalah sebagai berikut:</a:t>
+              <a:t>, maka dapat dirumuskan beberapa permasalahan dasar yang sederhana dan umum ditemukan, sehingga didapatkan rumusan masalah sebagai berikut:</a:t>
             </a:r>
           </a:p>
           <a:p>
@@ -49433,7 +49341,7 @@
                 <a:latin typeface="Lexend"/>
                 <a:sym typeface="Lexend"/>
               </a:rPr>
-              <a:t>Seminar Hasil Tesis | Selasa, 27 Agustus 2024</a:t>
+              <a:t>Seminar Hasil Tesis | Kamis, 22 Agustus 2024</a:t>
             </a:r>
             <a:endParaRPr lang="en-ID" sz="1200" dirty="0">
               <a:solidFill>
@@ -49908,7 +49816,7 @@
                 <a:latin typeface="Lexend"/>
                 <a:sym typeface="Lexend"/>
               </a:rPr>
-              <a:t>Seminar Hasil Tesis | Selasa, 27 Agustus 2024</a:t>
+              <a:t>Seminar Hasil Tesis | Kamis, 22 Agustus 2024</a:t>
             </a:r>
             <a:endParaRPr lang="en-ID" sz="1200" dirty="0">
               <a:solidFill>
@@ -50728,7 +50636,7 @@
                 <a:latin typeface="Lexend"/>
                 <a:sym typeface="Lexend"/>
               </a:rPr>
-              <a:t>Seminar Hasil Tesis | Selasa, 27 Agustus 2024</a:t>
+              <a:t>Seminar Hasil Tesis | Kamis, 22 Agustus 2024</a:t>
             </a:r>
             <a:endParaRPr lang="en-ID" sz="1200" dirty="0">
               <a:solidFill>
@@ -51566,7 +51474,7 @@
                 <a:latin typeface="Lexend"/>
                 <a:sym typeface="Lexend"/>
               </a:rPr>
-              <a:t>Seminar Hasil Tesis | Selasa, 27 Agustus 2024</a:t>
+              <a:t>Seminar Hasil Tesis | Kamis, 22 Agustus 2024</a:t>
             </a:r>
             <a:endParaRPr lang="en-ID" sz="1200" dirty="0">
               <a:solidFill>
@@ -53648,7 +53556,7 @@
                 <a:latin typeface="Lexend"/>
                 <a:sym typeface="Lexend"/>
               </a:rPr>
-              <a:t>Seminar Hasil Tesis | Selasa, 27 Agustus 2024</a:t>
+              <a:t>Seminar Hasil Tesis | Kamis, 22 Agustus 2024</a:t>
             </a:r>
             <a:endParaRPr lang="en-ID" sz="1600" dirty="0">
               <a:solidFill>

</xml_diff>